<commit_message>
train interp test raw
</commit_message>
<xml_diff>
--- a/lstm_test.pptx
+++ b/lstm_test.pptx
@@ -4698,7 +4698,7 @@
     <mc:Choice Requires="p14">
       <p:transition/>
     </mc:Choice>
-    <mc:Fallback xmlns="" xmlns:c="http://schemas.openxmlformats.org/drawingml/2006/chart" xmlns:dgm="http://schemas.openxmlformats.org/drawingml/2006/diagram" xmlns:dsp="http://schemas.microsoft.com/office/drawing/2008/diagram">
+    <mc:Fallback xmlns:dsp="http://schemas.microsoft.com/office/drawing/2008/diagram" xmlns:dgm="http://schemas.openxmlformats.org/drawingml/2006/diagram" xmlns:c="http://schemas.openxmlformats.org/drawingml/2006/chart" xmlns="">
       <p:transition/>
     </mc:Fallback>
   </mc:AlternateContent>
@@ -4754,7 +4754,7 @@
             <a:lum/>
             <a:extLst>
               <a:ext uri="783A4284-B454-46f5-B8C8-42B5039CE256">
-                <hp:hncPhoto xmlns="" xmlns:c="http://schemas.openxmlformats.org/drawingml/2006/chart" xmlns:dgm="http://schemas.openxmlformats.org/drawingml/2006/diagram" xmlns:dsp="http://schemas.microsoft.com/office/drawing/2008/diagram" xmlns:hp="http://schemas.haansoft.com/office/presentation/8.0">
+                <hp:hncPhoto xmlns:hp="http://schemas.haansoft.com/office/presentation/8.0" xmlns:dsp="http://schemas.microsoft.com/office/drawing/2008/diagram" xmlns:dgm="http://schemas.openxmlformats.org/drawingml/2006/diagram" xmlns:c="http://schemas.openxmlformats.org/drawingml/2006/chart" xmlns="">
                   <hd:imgLayer xmlns:hd="http://schemas.haansoft.com/office/drawingml/8.0" r:embed="rId3">
                     <hd:imgEffect xmlns:hd="http://schemas.haansoft.com/office/drawingml/8.0">
                       <hd:artEffectSharpenSoften amount="-100000"/>
@@ -4873,7 +4873,7 @@
     <mc:Choice Requires="p14">
       <p:transition/>
     </mc:Choice>
-    <mc:Fallback xmlns="" xmlns:c="http://schemas.openxmlformats.org/drawingml/2006/chart" xmlns:dgm="http://schemas.openxmlformats.org/drawingml/2006/diagram" xmlns:dsp="http://schemas.microsoft.com/office/drawing/2008/diagram">
+    <mc:Fallback xmlns:dsp="http://schemas.microsoft.com/office/drawing/2008/diagram" xmlns:dgm="http://schemas.openxmlformats.org/drawingml/2006/diagram" xmlns:c="http://schemas.openxmlformats.org/drawingml/2006/chart" xmlns="">
       <p:transition/>
     </mc:Fallback>
   </mc:AlternateContent>
@@ -5435,7 +5435,7 @@
             <a:lum/>
             <a:extLst>
               <a:ext uri="783A4284-B454-46f5-B8C8-42B5039CE256">
-                <hp:hncPhoto xmlns="" xmlns:c="http://schemas.openxmlformats.org/drawingml/2006/chart" xmlns:dgm="http://schemas.openxmlformats.org/drawingml/2006/diagram" xmlns:dsp="http://schemas.microsoft.com/office/drawing/2008/diagram" xmlns:hp="http://schemas.haansoft.com/office/presentation/8.0">
+                <hp:hncPhoto xmlns:hp="http://schemas.haansoft.com/office/presentation/8.0" xmlns:dsp="http://schemas.microsoft.com/office/drawing/2008/diagram" xmlns:dgm="http://schemas.openxmlformats.org/drawingml/2006/diagram" xmlns:c="http://schemas.openxmlformats.org/drawingml/2006/chart" xmlns="">
                   <hd:imgLayer xmlns:hd="http://schemas.haansoft.com/office/drawingml/8.0" r:embed="rId3">
                     <hd:imgEffect xmlns:hd="http://schemas.haansoft.com/office/drawingml/8.0">
                       <hd:artEffectSharpenSoften amount="-100000"/>
@@ -5537,7 +5537,7 @@
     <mc:Choice Requires="p14">
       <p:transition/>
     </mc:Choice>
-    <mc:Fallback xmlns="" xmlns:c="http://schemas.openxmlformats.org/drawingml/2006/chart" xmlns:dgm="http://schemas.openxmlformats.org/drawingml/2006/diagram" xmlns:dsp="http://schemas.microsoft.com/office/drawing/2008/diagram">
+    <mc:Fallback xmlns:dsp="http://schemas.microsoft.com/office/drawing/2008/diagram" xmlns:dgm="http://schemas.openxmlformats.org/drawingml/2006/diagram" xmlns:c="http://schemas.openxmlformats.org/drawingml/2006/chart" xmlns="">
       <p:transition/>
     </mc:Fallback>
   </mc:AlternateContent>
@@ -6420,6 +6420,42 @@
               <a:rPr lang="ko-KR" altLang="en-US" dirty="0"/>
               <a:t>및 시퀀스 생성</a:t>
             </a:r>
+            <a:r>
+              <a:rPr lang="en-US" altLang="ko-KR" dirty="0"/>
+              <a:t>(</a:t>
+            </a:r>
+            <a:r>
+              <a:rPr lang="ko-KR" altLang="en-US" dirty="0"/>
+              <a:t>입력</a:t>
+            </a:r>
+            <a:r>
+              <a:rPr lang="en-US" altLang="ko-KR" dirty="0"/>
+              <a:t>: 5</a:t>
+            </a:r>
+            <a:r>
+              <a:rPr lang="ko-KR" altLang="en-US" dirty="0"/>
+              <a:t>일 </a:t>
+            </a:r>
+            <a:r>
+              <a:rPr lang="en-US" altLang="ko-KR" dirty="0"/>
+              <a:t>-&gt; </a:t>
+            </a:r>
+            <a:r>
+              <a:rPr lang="ko-KR" altLang="en-US" dirty="0"/>
+              <a:t>출력</a:t>
+            </a:r>
+            <a:r>
+              <a:rPr lang="en-US" altLang="ko-KR" dirty="0"/>
+              <a:t>: 1</a:t>
+            </a:r>
+            <a:r>
+              <a:rPr lang="ko-KR" altLang="en-US" dirty="0"/>
+              <a:t>일</a:t>
+            </a:r>
+            <a:r>
+              <a:rPr lang="en-US" altLang="ko-KR"/>
+              <a:t>)</a:t>
+            </a:r>
             <a:endParaRPr lang="en-CA" altLang="ko-KR" dirty="0"/>
           </a:p>
         </p:txBody>
@@ -6753,7 +6789,7 @@
             <a:lum/>
             <a:extLst>
               <a:ext uri="783A4284-B454-46f5-B8C8-42B5039CE256">
-                <hp:hncPhoto xmlns="" xmlns:c="http://schemas.openxmlformats.org/drawingml/2006/chart" xmlns:dgm="http://schemas.openxmlformats.org/drawingml/2006/diagram" xmlns:dsp="http://schemas.microsoft.com/office/drawing/2008/diagram" xmlns:hp="http://schemas.haansoft.com/office/presentation/8.0">
+                <hp:hncPhoto xmlns:hp="http://schemas.haansoft.com/office/presentation/8.0" xmlns:dsp="http://schemas.microsoft.com/office/drawing/2008/diagram" xmlns:dgm="http://schemas.openxmlformats.org/drawingml/2006/diagram" xmlns:c="http://schemas.openxmlformats.org/drawingml/2006/chart" xmlns="">
                   <hd:imgLayer xmlns:hd="http://schemas.haansoft.com/office/drawingml/8.0" r:embed="rId3">
                     <hd:imgEffect xmlns:hd="http://schemas.haansoft.com/office/drawingml/8.0">
                       <hd:artEffectSharpenSoften amount="-100000"/>
@@ -6872,7 +6908,7 @@
     <mc:Choice Requires="p14">
       <p:transition/>
     </mc:Choice>
-    <mc:Fallback xmlns="" xmlns:c="http://schemas.openxmlformats.org/drawingml/2006/chart" xmlns:dgm="http://schemas.openxmlformats.org/drawingml/2006/diagram" xmlns:dsp="http://schemas.microsoft.com/office/drawing/2008/diagram">
+    <mc:Fallback xmlns:dsp="http://schemas.microsoft.com/office/drawing/2008/diagram" xmlns:dgm="http://schemas.openxmlformats.org/drawingml/2006/diagram" xmlns:c="http://schemas.openxmlformats.org/drawingml/2006/chart" xmlns="">
       <p:transition/>
     </mc:Fallback>
   </mc:AlternateContent>

</xml_diff>